<commit_message>
Extra slide with an overview
</commit_message>
<xml_diff>
--- a/M2/Skill/5-Pull request/5 Pull Request.pptx
+++ b/M2/Skill/5-Pull request/5 Pull Request.pptx
@@ -17,6 +17,7 @@
     <p:sldId id="265" r:id="rId11"/>
     <p:sldId id="266" r:id="rId12"/>
     <p:sldId id="267" r:id="rId13"/>
+    <p:sldId id="268" r:id="rId14"/>
   </p:sldIdLst>
   <p:sldSz cx="12192000" cy="6858000"/>
   <p:notesSz cx="6858000" cy="9144000"/>
@@ -270,7 +271,7 @@
           <a:p>
             <a:fld id="{846E8FAA-3A36-425B-B82F-08B25BF5FBC0}" type="datetimeFigureOut">
               <a:rPr lang="nl-NL" smtClean="0"/>
-              <a:t>16-12-2024</a:t>
+              <a:t>17-12-2024</a:t>
             </a:fld>
             <a:endParaRPr lang="nl-NL"/>
           </a:p>
@@ -324,7 +325,7 @@
           <a:p>
             <a:fld id="{835F038A-3025-449A-B5E8-05AB137F8807}" type="slidenum">
               <a:rPr lang="nl-NL" smtClean="0"/>
-              <a:t>‹nr.›</a:t>
+              <a:t>‹#›</a:t>
             </a:fld>
             <a:endParaRPr lang="nl-NL"/>
           </a:p>
@@ -468,7 +469,7 @@
           <a:p>
             <a:fld id="{846E8FAA-3A36-425B-B82F-08B25BF5FBC0}" type="datetimeFigureOut">
               <a:rPr lang="nl-NL" smtClean="0"/>
-              <a:t>16-12-2024</a:t>
+              <a:t>17-12-2024</a:t>
             </a:fld>
             <a:endParaRPr lang="nl-NL"/>
           </a:p>
@@ -522,7 +523,7 @@
           <a:p>
             <a:fld id="{835F038A-3025-449A-B5E8-05AB137F8807}" type="slidenum">
               <a:rPr lang="nl-NL" smtClean="0"/>
-              <a:t>‹nr.›</a:t>
+              <a:t>‹#›</a:t>
             </a:fld>
             <a:endParaRPr lang="nl-NL"/>
           </a:p>
@@ -676,7 +677,7 @@
           <a:p>
             <a:fld id="{846E8FAA-3A36-425B-B82F-08B25BF5FBC0}" type="datetimeFigureOut">
               <a:rPr lang="nl-NL" smtClean="0"/>
-              <a:t>16-12-2024</a:t>
+              <a:t>17-12-2024</a:t>
             </a:fld>
             <a:endParaRPr lang="nl-NL"/>
           </a:p>
@@ -730,7 +731,7 @@
           <a:p>
             <a:fld id="{835F038A-3025-449A-B5E8-05AB137F8807}" type="slidenum">
               <a:rPr lang="nl-NL" smtClean="0"/>
-              <a:t>‹nr.›</a:t>
+              <a:t>‹#›</a:t>
             </a:fld>
             <a:endParaRPr lang="nl-NL"/>
           </a:p>
@@ -874,7 +875,7 @@
           <a:p>
             <a:fld id="{846E8FAA-3A36-425B-B82F-08B25BF5FBC0}" type="datetimeFigureOut">
               <a:rPr lang="nl-NL" smtClean="0"/>
-              <a:t>16-12-2024</a:t>
+              <a:t>17-12-2024</a:t>
             </a:fld>
             <a:endParaRPr lang="nl-NL"/>
           </a:p>
@@ -928,7 +929,7 @@
           <a:p>
             <a:fld id="{835F038A-3025-449A-B5E8-05AB137F8807}" type="slidenum">
               <a:rPr lang="nl-NL" smtClean="0"/>
-              <a:t>‹nr.›</a:t>
+              <a:t>‹#›</a:t>
             </a:fld>
             <a:endParaRPr lang="nl-NL"/>
           </a:p>
@@ -1149,7 +1150,7 @@
           <a:p>
             <a:fld id="{846E8FAA-3A36-425B-B82F-08B25BF5FBC0}" type="datetimeFigureOut">
               <a:rPr lang="nl-NL" smtClean="0"/>
-              <a:t>16-12-2024</a:t>
+              <a:t>17-12-2024</a:t>
             </a:fld>
             <a:endParaRPr lang="nl-NL"/>
           </a:p>
@@ -1203,7 +1204,7 @@
           <a:p>
             <a:fld id="{835F038A-3025-449A-B5E8-05AB137F8807}" type="slidenum">
               <a:rPr lang="nl-NL" smtClean="0"/>
-              <a:t>‹nr.›</a:t>
+              <a:t>‹#›</a:t>
             </a:fld>
             <a:endParaRPr lang="nl-NL"/>
           </a:p>
@@ -1414,7 +1415,7 @@
           <a:p>
             <a:fld id="{846E8FAA-3A36-425B-B82F-08B25BF5FBC0}" type="datetimeFigureOut">
               <a:rPr lang="nl-NL" smtClean="0"/>
-              <a:t>16-12-2024</a:t>
+              <a:t>17-12-2024</a:t>
             </a:fld>
             <a:endParaRPr lang="nl-NL"/>
           </a:p>
@@ -1468,7 +1469,7 @@
           <a:p>
             <a:fld id="{835F038A-3025-449A-B5E8-05AB137F8807}" type="slidenum">
               <a:rPr lang="nl-NL" smtClean="0"/>
-              <a:t>‹nr.›</a:t>
+              <a:t>‹#›</a:t>
             </a:fld>
             <a:endParaRPr lang="nl-NL"/>
           </a:p>
@@ -1826,7 +1827,7 @@
           <a:p>
             <a:fld id="{846E8FAA-3A36-425B-B82F-08B25BF5FBC0}" type="datetimeFigureOut">
               <a:rPr lang="nl-NL" smtClean="0"/>
-              <a:t>16-12-2024</a:t>
+              <a:t>17-12-2024</a:t>
             </a:fld>
             <a:endParaRPr lang="nl-NL"/>
           </a:p>
@@ -1880,7 +1881,7 @@
           <a:p>
             <a:fld id="{835F038A-3025-449A-B5E8-05AB137F8807}" type="slidenum">
               <a:rPr lang="nl-NL" smtClean="0"/>
-              <a:t>‹nr.›</a:t>
+              <a:t>‹#›</a:t>
             </a:fld>
             <a:endParaRPr lang="nl-NL"/>
           </a:p>
@@ -1967,7 +1968,7 @@
           <a:p>
             <a:fld id="{846E8FAA-3A36-425B-B82F-08B25BF5FBC0}" type="datetimeFigureOut">
               <a:rPr lang="nl-NL" smtClean="0"/>
-              <a:t>16-12-2024</a:t>
+              <a:t>17-12-2024</a:t>
             </a:fld>
             <a:endParaRPr lang="nl-NL"/>
           </a:p>
@@ -2021,7 +2022,7 @@
           <a:p>
             <a:fld id="{835F038A-3025-449A-B5E8-05AB137F8807}" type="slidenum">
               <a:rPr lang="nl-NL" smtClean="0"/>
-              <a:t>‹nr.›</a:t>
+              <a:t>‹#›</a:t>
             </a:fld>
             <a:endParaRPr lang="nl-NL"/>
           </a:p>
@@ -2080,7 +2081,7 @@
           <a:p>
             <a:fld id="{846E8FAA-3A36-425B-B82F-08B25BF5FBC0}" type="datetimeFigureOut">
               <a:rPr lang="nl-NL" smtClean="0"/>
-              <a:t>16-12-2024</a:t>
+              <a:t>17-12-2024</a:t>
             </a:fld>
             <a:endParaRPr lang="nl-NL"/>
           </a:p>
@@ -2134,7 +2135,7 @@
           <a:p>
             <a:fld id="{835F038A-3025-449A-B5E8-05AB137F8807}" type="slidenum">
               <a:rPr lang="nl-NL" smtClean="0"/>
-              <a:t>‹nr.›</a:t>
+              <a:t>‹#›</a:t>
             </a:fld>
             <a:endParaRPr lang="nl-NL"/>
           </a:p>
@@ -2391,7 +2392,7 @@
           <a:p>
             <a:fld id="{846E8FAA-3A36-425B-B82F-08B25BF5FBC0}" type="datetimeFigureOut">
               <a:rPr lang="nl-NL" smtClean="0"/>
-              <a:t>16-12-2024</a:t>
+              <a:t>17-12-2024</a:t>
             </a:fld>
             <a:endParaRPr lang="nl-NL"/>
           </a:p>
@@ -2445,7 +2446,7 @@
           <a:p>
             <a:fld id="{835F038A-3025-449A-B5E8-05AB137F8807}" type="slidenum">
               <a:rPr lang="nl-NL" smtClean="0"/>
-              <a:t>‹nr.›</a:t>
+              <a:t>‹#›</a:t>
             </a:fld>
             <a:endParaRPr lang="nl-NL"/>
           </a:p>
@@ -2679,7 +2680,7 @@
           <a:p>
             <a:fld id="{846E8FAA-3A36-425B-B82F-08B25BF5FBC0}" type="datetimeFigureOut">
               <a:rPr lang="nl-NL" smtClean="0"/>
-              <a:t>16-12-2024</a:t>
+              <a:t>17-12-2024</a:t>
             </a:fld>
             <a:endParaRPr lang="nl-NL"/>
           </a:p>
@@ -2733,7 +2734,7 @@
           <a:p>
             <a:fld id="{835F038A-3025-449A-B5E8-05AB137F8807}" type="slidenum">
               <a:rPr lang="nl-NL" smtClean="0"/>
-              <a:t>‹nr.›</a:t>
+              <a:t>‹#›</a:t>
             </a:fld>
             <a:endParaRPr lang="nl-NL"/>
           </a:p>
@@ -2920,7 +2921,7 @@
           <a:p>
             <a:fld id="{846E8FAA-3A36-425B-B82F-08B25BF5FBC0}" type="datetimeFigureOut">
               <a:rPr lang="nl-NL" smtClean="0"/>
-              <a:t>16-12-2024</a:t>
+              <a:t>17-12-2024</a:t>
             </a:fld>
             <a:endParaRPr lang="nl-NL"/>
           </a:p>
@@ -3010,7 +3011,7 @@
           <a:p>
             <a:fld id="{835F038A-3025-449A-B5E8-05AB137F8807}" type="slidenum">
               <a:rPr lang="nl-NL" smtClean="0"/>
-              <a:t>‹nr.›</a:t>
+              <a:t>‹#›</a:t>
             </a:fld>
             <a:endParaRPr lang="nl-NL"/>
           </a:p>
@@ -4050,6 +4051,336 @@
 </p:sld>
 </file>
 
+<file path=ppt/slides/slide13.xml><?xml version="1.0" encoding="utf-8"?>
+<p:sld xmlns:a="http://schemas.openxmlformats.org/drawingml/2006/main" xmlns:r="http://schemas.openxmlformats.org/officeDocument/2006/relationships" xmlns:p="http://schemas.openxmlformats.org/presentationml/2006/main">
+  <p:cSld>
+    <p:spTree>
+      <p:nvGrpSpPr>
+        <p:cNvPr id="1" name="">
+          <a:extLst>
+            <a:ext uri="{FF2B5EF4-FFF2-40B4-BE49-F238E27FC236}">
+              <a16:creationId xmlns:a16="http://schemas.microsoft.com/office/drawing/2014/main" id="{204E395B-955C-31F8-53A2-8105593C466A}"/>
+            </a:ext>
+          </a:extLst>
+        </p:cNvPr>
+        <p:cNvGrpSpPr/>
+        <p:nvPr/>
+      </p:nvGrpSpPr>
+      <p:grpSpPr>
+        <a:xfrm>
+          <a:off x="0" y="0"/>
+          <a:ext cx="0" cy="0"/>
+          <a:chOff x="0" y="0"/>
+          <a:chExt cx="0" cy="0"/>
+        </a:xfrm>
+      </p:grpSpPr>
+      <p:sp>
+        <p:nvSpPr>
+          <p:cNvPr id="2" name="Titel 1">
+            <a:extLst>
+              <a:ext uri="{FF2B5EF4-FFF2-40B4-BE49-F238E27FC236}">
+                <a16:creationId xmlns:a16="http://schemas.microsoft.com/office/drawing/2014/main" id="{806FD70C-4BC2-0056-BDF4-221F5254CD9C}"/>
+              </a:ext>
+            </a:extLst>
+          </p:cNvPr>
+          <p:cNvSpPr>
+            <a:spLocks noGrp="1"/>
+          </p:cNvSpPr>
+          <p:nvPr>
+            <p:ph type="title"/>
+          </p:nvPr>
+        </p:nvSpPr>
+        <p:spPr/>
+        <p:txBody>
+          <a:bodyPr/>
+          <a:lstStyle/>
+          <a:p>
+            <a:r>
+              <a:rPr lang="en-US" dirty="0" err="1"/>
+              <a:t>Overzicht</a:t>
+            </a:r>
+            <a:r>
+              <a:rPr lang="en-US" dirty="0"/>
+              <a:t>	</a:t>
+            </a:r>
+            <a:endParaRPr lang="nl-NL" dirty="0"/>
+          </a:p>
+        </p:txBody>
+      </p:sp>
+      <p:sp>
+        <p:nvSpPr>
+          <p:cNvPr id="3" name="Tijdelijke aanduiding voor inhoud 2">
+            <a:extLst>
+              <a:ext uri="{FF2B5EF4-FFF2-40B4-BE49-F238E27FC236}">
+                <a16:creationId xmlns:a16="http://schemas.microsoft.com/office/drawing/2014/main" id="{C615414E-1EDC-0C25-5CDA-EE4ABB8F2469}"/>
+              </a:ext>
+            </a:extLst>
+          </p:cNvPr>
+          <p:cNvSpPr>
+            <a:spLocks noGrp="1"/>
+          </p:cNvSpPr>
+          <p:nvPr>
+            <p:ph idx="1"/>
+          </p:nvPr>
+        </p:nvSpPr>
+        <p:spPr/>
+        <p:txBody>
+          <a:bodyPr>
+            <a:normAutofit lnSpcReduction="10000"/>
+          </a:bodyPr>
+          <a:lstStyle/>
+          <a:p>
+            <a:r>
+              <a:rPr lang="en-US" dirty="0" err="1"/>
+              <a:t>Nieuwe</a:t>
+            </a:r>
+            <a:r>
+              <a:rPr lang="en-US" dirty="0"/>
+              <a:t> repo </a:t>
+            </a:r>
+            <a:r>
+              <a:rPr lang="en-US" dirty="0" err="1"/>
+              <a:t>aangemaakt</a:t>
+            </a:r>
+            <a:r>
+              <a:rPr lang="en-US" dirty="0"/>
+              <a:t> </a:t>
+            </a:r>
+            <a:r>
+              <a:rPr lang="en-US" dirty="0" err="1"/>
+              <a:t>bij</a:t>
+            </a:r>
+            <a:r>
+              <a:rPr lang="en-US" dirty="0"/>
+              <a:t> </a:t>
+            </a:r>
+            <a:r>
+              <a:rPr lang="en-US" dirty="0" err="1"/>
+              <a:t>github.com</a:t>
+            </a:r>
+            <a:endParaRPr lang="en-US" dirty="0"/>
+          </a:p>
+          <a:p>
+            <a:r>
+              <a:rPr lang="en-US" dirty="0" err="1"/>
+              <a:t>Lokaal</a:t>
+            </a:r>
+            <a:r>
+              <a:rPr lang="en-US" dirty="0"/>
+              <a:t> de </a:t>
+            </a:r>
+            <a:r>
+              <a:rPr lang="en-US" dirty="0" err="1"/>
+              <a:t>nieuwe</a:t>
+            </a:r>
+            <a:r>
+              <a:rPr lang="en-US" dirty="0"/>
+              <a:t> repo </a:t>
+            </a:r>
+            <a:r>
+              <a:rPr lang="en-US" dirty="0" err="1"/>
+              <a:t>uitchecken</a:t>
+            </a:r>
+            <a:endParaRPr lang="en-US" dirty="0"/>
+          </a:p>
+          <a:p>
+            <a:r>
+              <a:rPr lang="en-US" dirty="0"/>
+              <a:t>Maak </a:t>
+            </a:r>
+            <a:r>
+              <a:rPr lang="en-US" dirty="0" err="1"/>
+              <a:t>lokaal</a:t>
+            </a:r>
+            <a:r>
+              <a:rPr lang="en-US" dirty="0"/>
+              <a:t> </a:t>
+            </a:r>
+            <a:r>
+              <a:rPr lang="en-US" dirty="0" err="1"/>
+              <a:t>een</a:t>
+            </a:r>
+            <a:r>
+              <a:rPr lang="en-US" dirty="0"/>
+              <a:t> </a:t>
+            </a:r>
+            <a:r>
+              <a:rPr lang="en-US" dirty="0" err="1"/>
+              <a:t>nieuwe</a:t>
+            </a:r>
+            <a:r>
+              <a:rPr lang="en-US" dirty="0"/>
+              <a:t> branch </a:t>
+            </a:r>
+            <a:r>
+              <a:rPr lang="en-US" dirty="0" err="1"/>
+              <a:t>aan</a:t>
+            </a:r>
+            <a:r>
+              <a:rPr lang="en-US" dirty="0"/>
+              <a:t> </a:t>
+            </a:r>
+            <a:r>
+              <a:rPr lang="en-US" dirty="0" err="1"/>
+              <a:t>én</a:t>
+            </a:r>
+            <a:r>
+              <a:rPr lang="en-US" dirty="0"/>
+              <a:t> check </a:t>
+            </a:r>
+            <a:r>
+              <a:rPr lang="en-US" dirty="0" err="1"/>
+              <a:t>deze</a:t>
+            </a:r>
+            <a:r>
+              <a:rPr lang="en-US" dirty="0"/>
+              <a:t> </a:t>
+            </a:r>
+            <a:r>
+              <a:rPr lang="en-US" dirty="0" err="1"/>
+              <a:t>uit</a:t>
+            </a:r>
+            <a:endParaRPr lang="en-US" dirty="0"/>
+          </a:p>
+          <a:p>
+            <a:r>
+              <a:rPr lang="en-US" dirty="0"/>
+              <a:t>Pas </a:t>
+            </a:r>
+            <a:r>
+              <a:rPr lang="en-US" dirty="0" err="1"/>
+              <a:t>iets</a:t>
+            </a:r>
+            <a:r>
+              <a:rPr lang="en-US" dirty="0"/>
+              <a:t> </a:t>
+            </a:r>
+            <a:r>
+              <a:rPr lang="en-US" dirty="0" err="1"/>
+              <a:t>aan</a:t>
+            </a:r>
+            <a:r>
+              <a:rPr lang="en-US" dirty="0"/>
+              <a:t> in de </a:t>
+            </a:r>
+            <a:r>
+              <a:rPr lang="en-US" dirty="0" err="1"/>
+              <a:t>readme.md</a:t>
+            </a:r>
+            <a:endParaRPr lang="en-US" dirty="0"/>
+          </a:p>
+          <a:p>
+            <a:r>
+              <a:rPr lang="en-US" dirty="0"/>
+              <a:t>git add &amp;&amp; git commit –m ‘</a:t>
+            </a:r>
+            <a:r>
+              <a:rPr lang="en-US" dirty="0" err="1"/>
+              <a:t>mijn</a:t>
+            </a:r>
+            <a:r>
+              <a:rPr lang="en-US" dirty="0"/>
+              <a:t> </a:t>
+            </a:r>
+            <a:r>
+              <a:rPr lang="en-US" dirty="0" err="1"/>
+              <a:t>wijziging</a:t>
+            </a:r>
+            <a:r>
+              <a:rPr lang="en-US" dirty="0"/>
+              <a:t>’</a:t>
+            </a:r>
+          </a:p>
+          <a:p>
+            <a:r>
+              <a:rPr lang="en-US" dirty="0"/>
+              <a:t>Push </a:t>
+            </a:r>
+            <a:r>
+              <a:rPr lang="en-US" dirty="0" err="1"/>
+              <a:t>deze</a:t>
+            </a:r>
+            <a:r>
+              <a:rPr lang="en-US" dirty="0"/>
+              <a:t> </a:t>
+            </a:r>
+            <a:r>
+              <a:rPr lang="en-US" dirty="0" err="1"/>
+              <a:t>nieuwe</a:t>
+            </a:r>
+            <a:r>
+              <a:rPr lang="en-US" dirty="0"/>
+              <a:t> branch </a:t>
+            </a:r>
+            <a:r>
+              <a:rPr lang="en-US" dirty="0" err="1"/>
+              <a:t>naar</a:t>
+            </a:r>
+            <a:r>
+              <a:rPr lang="en-US" dirty="0"/>
+              <a:t> </a:t>
+            </a:r>
+            <a:r>
+              <a:rPr lang="en-US" dirty="0" err="1"/>
+              <a:t>github</a:t>
+            </a:r>
+            <a:endParaRPr lang="en-US" dirty="0"/>
+          </a:p>
+          <a:p>
+            <a:r>
+              <a:rPr lang="en-US" dirty="0"/>
+              <a:t>Maak </a:t>
+            </a:r>
+            <a:r>
+              <a:rPr lang="en-US" dirty="0" err="1"/>
+              <a:t>een</a:t>
+            </a:r>
+            <a:r>
+              <a:rPr lang="en-US" dirty="0"/>
+              <a:t> PR</a:t>
+            </a:r>
+          </a:p>
+          <a:p>
+            <a:r>
+              <a:rPr lang="en-US" dirty="0"/>
+              <a:t>Controller </a:t>
+            </a:r>
+            <a:r>
+              <a:rPr lang="en-US" dirty="0" err="1"/>
+              <a:t>deze</a:t>
+            </a:r>
+            <a:r>
+              <a:rPr lang="en-US" dirty="0"/>
+              <a:t> PR</a:t>
+            </a:r>
+          </a:p>
+          <a:p>
+            <a:r>
+              <a:rPr lang="en-US" dirty="0"/>
+              <a:t>Merge je PR</a:t>
+            </a:r>
+          </a:p>
+          <a:p>
+            <a:endParaRPr lang="en-US" dirty="0"/>
+          </a:p>
+          <a:p>
+            <a:endParaRPr lang="nl-NL" dirty="0"/>
+          </a:p>
+        </p:txBody>
+      </p:sp>
+    </p:spTree>
+    <p:extLst>
+      <p:ext uri="{BB962C8B-B14F-4D97-AF65-F5344CB8AC3E}">
+        <p14:creationId xmlns:p14="http://schemas.microsoft.com/office/powerpoint/2010/main" val="664230995"/>
+      </p:ext>
+    </p:extLst>
+  </p:cSld>
+  <p:clrMapOvr>
+    <a:masterClrMapping/>
+  </p:clrMapOvr>
+</p:sld>
+</file>
+
 <file path=ppt/slides/slide2.xml><?xml version="1.0" encoding="utf-8"?>
 <p:sld xmlns:a="http://schemas.openxmlformats.org/drawingml/2006/main" xmlns:r="http://schemas.openxmlformats.org/officeDocument/2006/relationships" xmlns:p="http://schemas.openxmlformats.org/presentationml/2006/main">
   <p:cSld>
@@ -5187,8 +5518,11 @@
             </a:r>
             <a:r>
               <a:rPr lang="en-US" dirty="0"/>
-              <a:t> branch feature/</a:t>
-            </a:r>
+              <a:t> branch feature</a:t>
+            </a:r>
+            <a:br>
+              <a:rPr lang="en-US" dirty="0"/>
+            </a:br>
             <a:r>
               <a:rPr lang="en-US" dirty="0" err="1"/>
               <a:t>voeg</a:t>
@@ -5232,7 +5566,14 @@
           <a:p>
             <a:r>
               <a:rPr lang="nl-NL" dirty="0"/>
-              <a:t>Opdracht: Maak een nieuwe </a:t>
+              <a:t>Opdracht: </a:t>
+            </a:r>
+          </a:p>
+          <a:p>
+            <a:pPr lvl="1"/>
+            <a:r>
+              <a:rPr lang="nl-NL" dirty="0"/>
+              <a:t>Maak een nieuwe </a:t>
             </a:r>
             <a:r>
               <a:rPr lang="nl-NL" dirty="0" err="1"/>
@@ -5334,6 +5675,10 @@
             </a:r>
           </a:p>
           <a:p>
+            <a:endParaRPr lang="nl-NL" dirty="0"/>
+          </a:p>
+          <a:p>
+            <a:pPr lvl="1"/>
             <a:r>
               <a:rPr lang="nl-NL" dirty="0"/>
               <a:t>Of korter:</a:t>

</xml_diff>